<commit_message>
feat(3_derivation_3): update ppt, code
</commit_message>
<xml_diff>
--- a/lessons/3_derivation_3/ppt/全连接层的前向和后向传播推导（下）.pptx
+++ b/lessons/3_derivation_3/ppt/全连接层的前向和后向传播推导（下）.pptx
@@ -5,10 +5,10 @@
     <p:sldMasterId id="2147483648" r:id="rId1"/>
   </p:sldMasterIdLst>
   <p:notesMasterIdLst>
-    <p:notesMasterId r:id="rId32"/>
+    <p:notesMasterId r:id="rId33"/>
   </p:notesMasterIdLst>
   <p:handoutMasterIdLst>
-    <p:handoutMasterId r:id="rId33"/>
+    <p:handoutMasterId r:id="rId34"/>
   </p:handoutMasterIdLst>
   <p:sldIdLst>
     <p:sldId id="307" r:id="rId2"/>
@@ -24,28 +24,29 @@
     <p:sldId id="1002" r:id="rId12"/>
     <p:sldId id="1026" r:id="rId13"/>
     <p:sldId id="1027" r:id="rId14"/>
-    <p:sldId id="1029" r:id="rId15"/>
-    <p:sldId id="1016" r:id="rId16"/>
-    <p:sldId id="1030" r:id="rId17"/>
+    <p:sldId id="1016" r:id="rId15"/>
+    <p:sldId id="1030" r:id="rId16"/>
+    <p:sldId id="1033" r:id="rId17"/>
     <p:sldId id="1017" r:id="rId18"/>
     <p:sldId id="1032" r:id="rId19"/>
-    <p:sldId id="1018" r:id="rId20"/>
-    <p:sldId id="1015" r:id="rId21"/>
-    <p:sldId id="1019" r:id="rId22"/>
-    <p:sldId id="1023" r:id="rId23"/>
-    <p:sldId id="1024" r:id="rId24"/>
-    <p:sldId id="537" r:id="rId25"/>
-    <p:sldId id="536" r:id="rId26"/>
-    <p:sldId id="1014" r:id="rId27"/>
-    <p:sldId id="1013" r:id="rId28"/>
-    <p:sldId id="997" r:id="rId29"/>
-    <p:sldId id="998" r:id="rId30"/>
-    <p:sldId id="653" r:id="rId31"/>
+    <p:sldId id="1034" r:id="rId20"/>
+    <p:sldId id="1035" r:id="rId21"/>
+    <p:sldId id="1015" r:id="rId22"/>
+    <p:sldId id="1019" r:id="rId23"/>
+    <p:sldId id="1023" r:id="rId24"/>
+    <p:sldId id="1024" r:id="rId25"/>
+    <p:sldId id="537" r:id="rId26"/>
+    <p:sldId id="536" r:id="rId27"/>
+    <p:sldId id="1014" r:id="rId28"/>
+    <p:sldId id="1013" r:id="rId29"/>
+    <p:sldId id="997" r:id="rId30"/>
+    <p:sldId id="998" r:id="rId31"/>
+    <p:sldId id="653" r:id="rId32"/>
   </p:sldIdLst>
   <p:sldSz cx="12192000" cy="6858000"/>
   <p:notesSz cx="6858000" cy="9144000"/>
   <p:custDataLst>
-    <p:tags r:id="rId34"/>
+    <p:tags r:id="rId35"/>
   </p:custDataLst>
   <p:defaultTextStyle>
     <a:defPPr>
@@ -7649,6 +7650,86 @@
                   <a:rPr lang="zh-CN" altLang="en-US" dirty="0"/>
                   <a:t>，并且去掉激活函数？</a:t>
                 </a:r>
+                <a:endParaRPr lang="en-US" altLang="zh-CN" dirty="0"/>
+              </a:p>
+              <a:p>
+                <a:pPr marL="285750" indent="-285750">
+                  <a:buFont typeface="Arial" panose="020B0604020202020204" pitchFamily="34" charset="0"/>
+                  <a:buChar char="•"/>
+                </a:pPr>
+                <a:r>
+                  <a:rPr lang="en-US" altLang="zh-CN" dirty="0"/>
+                  <a:t>TODO </a:t>
+                </a:r>
+                <a:r>
+                  <a:rPr lang="zh-CN" altLang="en-US" dirty="0"/>
+                  <a:t>求</a:t>
+                </a:r>
+                <a14:m>
+                  <m:oMath xmlns:m="http://schemas.openxmlformats.org/officeDocument/2006/math">
+                    <m:f>
+                      <m:fPr>
+                        <m:ctrlPr>
+                          <a:rPr lang="en-US" altLang="zh-CN" i="1">
+                            <a:latin typeface="Cambria Math" panose="02040503050406030204" pitchFamily="18" charset="0"/>
+                          </a:rPr>
+                        </m:ctrlPr>
+                      </m:fPr>
+                      <m:num>
+                        <m:r>
+                          <a:rPr lang="en-US" altLang="zh-CN" i="1">
+                            <a:latin typeface="Cambria Math" panose="02040503050406030204" pitchFamily="18" charset="0"/>
+                          </a:rPr>
+                          <m:t>𝑑𝐸</m:t>
+                        </m:r>
+                      </m:num>
+                      <m:den>
+                        <m:r>
+                          <a:rPr lang="en-US" altLang="zh-CN" i="1">
+                            <a:latin typeface="Cambria Math" panose="02040503050406030204" pitchFamily="18" charset="0"/>
+                          </a:rPr>
+                          <m:t>𝑑</m:t>
+                        </m:r>
+                        <m:sSub>
+                          <m:sSubPr>
+                            <m:ctrlPr>
+                              <a:rPr lang="en-US" altLang="zh-CN" i="1">
+                                <a:latin typeface="Cambria Math" panose="02040503050406030204" pitchFamily="18" charset="0"/>
+                              </a:rPr>
+                            </m:ctrlPr>
+                          </m:sSubPr>
+                          <m:e>
+                            <m:r>
+                              <a:rPr lang="en-US" altLang="zh-CN" i="1">
+                                <a:latin typeface="Cambria Math" panose="02040503050406030204" pitchFamily="18" charset="0"/>
+                              </a:rPr>
+                              <m:t>𝑤</m:t>
+                            </m:r>
+                          </m:e>
+                          <m:sub>
+                            <m:r>
+                              <a:rPr lang="en-US" altLang="zh-CN" b="0" i="1" smtClean="0">
+                                <a:latin typeface="Cambria Math" panose="02040503050406030204" pitchFamily="18" charset="0"/>
+                              </a:rPr>
+                              <m:t>53</m:t>
+                            </m:r>
+                          </m:sub>
+                        </m:sSub>
+                      </m:den>
+                    </m:f>
+                  </m:oMath>
+                </a14:m>
+                <a:r>
+                  <a:rPr lang="en-US" altLang="zh-CN" dirty="0"/>
+                  <a:t> tu</a:t>
+                </a:r>
+              </a:p>
+              <a:p>
+                <a:pPr marL="285750" indent="-285750">
+                  <a:buFont typeface="Arial" panose="020B0604020202020204" pitchFamily="34" charset="0"/>
+                  <a:buChar char="•"/>
+                </a:pPr>
+                <a:endParaRPr lang="zh-CN" altLang="en-US" dirty="0"/>
               </a:p>
               <a:p>
                 <a:pPr marL="285750" indent="-285750">
@@ -7814,7 +7895,7 @@
         </p:blipFill>
         <p:spPr>
           <a:xfrm>
-            <a:off x="793819" y="2684454"/>
+            <a:off x="1296237" y="2919158"/>
             <a:ext cx="6461879" cy="2953166"/>
           </a:xfrm>
           <a:prstGeom prst="rect">
@@ -7839,286 +7920,6 @@
 </file>
 
 <file path=ppt/slides/slide14.xml><?xml version="1.0" encoding="utf-8"?>
-<p:sld xmlns:a="http://schemas.openxmlformats.org/drawingml/2006/main" xmlns:r="http://schemas.openxmlformats.org/officeDocument/2006/relationships" xmlns:p="http://schemas.openxmlformats.org/presentationml/2006/main">
-  <p:cSld>
-    <p:spTree>
-      <p:nvGrpSpPr>
-        <p:cNvPr id="1" name=""/>
-        <p:cNvGrpSpPr/>
-        <p:nvPr/>
-      </p:nvGrpSpPr>
-      <p:grpSpPr>
-        <a:xfrm>
-          <a:off x="0" y="0"/>
-          <a:ext cx="0" cy="0"/>
-          <a:chOff x="0" y="0"/>
-          <a:chExt cx="0" cy="0"/>
-        </a:xfrm>
-      </p:grpSpPr>
-      <mc:AlternateContent xmlns:mc="http://schemas.openxmlformats.org/markup-compatibility/2006">
-        <mc:Choice xmlns:a14="http://schemas.microsoft.com/office/drawing/2010/main" Requires="a14">
-          <p:sp>
-            <p:nvSpPr>
-              <p:cNvPr id="2" name="文本占位符 1"/>
-              <p:cNvSpPr>
-                <a:spLocks noGrp="1"/>
-              </p:cNvSpPr>
-              <p:nvPr>
-                <p:ph type="body" idx="1"/>
-              </p:nvPr>
-            </p:nvSpPr>
-            <p:spPr/>
-            <p:txBody>
-              <a:bodyPr/>
-              <a:lstStyle/>
-              <a:p>
-                <a:pPr marL="285750" indent="-285750">
-                  <a:buFont typeface="Arial" panose="020B0604020202020204" pitchFamily="34" charset="0"/>
-                  <a:buChar char="•"/>
-                </a:pPr>
-                <a:r>
-                  <a:rPr lang="zh-CN" altLang="en-US" dirty="0"/>
-                  <a:t>隐藏层的梯度下降公式是什么？</a:t>
-                </a:r>
-                <a:endParaRPr lang="en-US" altLang="zh-CN" dirty="0"/>
-              </a:p>
-              <a:p>
-                <a:pPr marL="285750" indent="-285750">
-                  <a:buFont typeface="Arial" panose="020B0604020202020204" pitchFamily="34" charset="0"/>
-                  <a:buChar char="•"/>
-                </a:pPr>
-                <a:endParaRPr lang="en-US" altLang="zh-CN" dirty="0"/>
-              </a:p>
-              <a:p>
-                <a:pPr marL="285750" indent="-285750">
-                  <a:buFont typeface="Arial" panose="020B0604020202020204" pitchFamily="34" charset="0"/>
-                  <a:buChar char="•"/>
-                </a:pPr>
-                <a:endParaRPr lang="en-US" altLang="zh-CN" dirty="0"/>
-              </a:p>
-              <a:p>
-                <a:pPr marL="285750" indent="-285750">
-                  <a:buFont typeface="Arial" panose="020B0604020202020204" pitchFamily="34" charset="0"/>
-                  <a:buChar char="•"/>
-                </a:pPr>
-                <a:endParaRPr lang="en-US" altLang="zh-CN" dirty="0"/>
-              </a:p>
-              <a:p>
-                <a:pPr marL="285750" indent="-285750">
-                  <a:buFont typeface="Arial" panose="020B0604020202020204" pitchFamily="34" charset="0"/>
-                  <a:buChar char="•"/>
-                </a:pPr>
-                <a:endParaRPr lang="en-US" altLang="zh-CN" dirty="0"/>
-              </a:p>
-              <a:p>
-                <a:pPr marL="285750" indent="-285750">
-                  <a:buFont typeface="Arial" panose="020B0604020202020204" pitchFamily="34" charset="0"/>
-                  <a:buChar char="•"/>
-                </a:pPr>
-                <a:r>
-                  <a:rPr lang="zh-CN" altLang="en-US" dirty="0"/>
-                  <a:t>如何求</a:t>
-                </a:r>
-                <a14:m>
-                  <m:oMath xmlns:m="http://schemas.openxmlformats.org/officeDocument/2006/math">
-                    <m:f>
-                      <m:fPr>
-                        <m:ctrlPr>
-                          <a:rPr lang="en-US" altLang="zh-CN" i="1">
-                            <a:latin typeface="Cambria Math" panose="02040503050406030204" pitchFamily="18" charset="0"/>
-                          </a:rPr>
-                        </m:ctrlPr>
-                      </m:fPr>
-                      <m:num>
-                        <m:r>
-                          <a:rPr lang="en-US" altLang="zh-CN" i="1">
-                            <a:latin typeface="Cambria Math" panose="02040503050406030204" pitchFamily="18" charset="0"/>
-                          </a:rPr>
-                          <m:t>𝑑𝐸</m:t>
-                        </m:r>
-                      </m:num>
-                      <m:den>
-                        <m:r>
-                          <a:rPr lang="en-US" altLang="zh-CN" i="1">
-                            <a:latin typeface="Cambria Math" panose="02040503050406030204" pitchFamily="18" charset="0"/>
-                          </a:rPr>
-                          <m:t>𝑑</m:t>
-                        </m:r>
-                        <m:sSub>
-                          <m:sSubPr>
-                            <m:ctrlPr>
-                              <a:rPr lang="en-US" altLang="zh-CN" i="1">
-                                <a:latin typeface="Cambria Math" panose="02040503050406030204" pitchFamily="18" charset="0"/>
-                              </a:rPr>
-                            </m:ctrlPr>
-                          </m:sSubPr>
-                          <m:e>
-                            <m:r>
-                              <a:rPr lang="en-US" altLang="zh-CN" i="1">
-                                <a:latin typeface="Cambria Math" panose="02040503050406030204" pitchFamily="18" charset="0"/>
-                              </a:rPr>
-                              <m:t>𝑤</m:t>
-                            </m:r>
-                          </m:e>
-                          <m:sub>
-                            <m:r>
-                              <a:rPr lang="en-US" altLang="zh-CN" b="0" i="1" smtClean="0">
-                                <a:latin typeface="Cambria Math" panose="02040503050406030204" pitchFamily="18" charset="0"/>
-                              </a:rPr>
-                              <m:t>31</m:t>
-                            </m:r>
-                          </m:sub>
-                        </m:sSub>
-                      </m:den>
-                    </m:f>
-                  </m:oMath>
-                </a14:m>
-                <a:r>
-                  <a:rPr lang="zh-CN" altLang="en-US" dirty="0"/>
-                  <a:t>？</a:t>
-                </a:r>
-              </a:p>
-              <a:p>
-                <a:pPr marL="285750" indent="-285750">
-                  <a:buFont typeface="Arial" panose="020B0604020202020204" pitchFamily="34" charset="0"/>
-                  <a:buChar char="•"/>
-                </a:pPr>
-                <a:r>
-                  <a:rPr lang="zh-CN" altLang="en-US" dirty="0"/>
-                  <a:t>如何去掉激活函数</a:t>
-                </a:r>
-                <a:r>
-                  <a:rPr lang="en-US" altLang="zh-CN" dirty="0"/>
-                  <a:t>?</a:t>
-                </a:r>
-              </a:p>
-              <a:p>
-                <a:pPr marL="285750" indent="-285750">
-                  <a:buFont typeface="Arial" panose="020B0604020202020204" pitchFamily="34" charset="0"/>
-                  <a:buChar char="•"/>
-                </a:pPr>
-                <a:endParaRPr lang="en-US" altLang="zh-CN" dirty="0"/>
-              </a:p>
-              <a:p>
-                <a:pPr marL="285750" indent="-285750">
-                  <a:buFont typeface="Arial" panose="020B0604020202020204" pitchFamily="34" charset="0"/>
-                  <a:buChar char="•"/>
-                </a:pPr>
-                <a:endParaRPr lang="en-US" altLang="zh-CN" dirty="0"/>
-              </a:p>
-              <a:p>
-                <a:pPr marL="285750" indent="-285750">
-                  <a:buFont typeface="Arial" panose="020B0604020202020204" pitchFamily="34" charset="0"/>
-                  <a:buChar char="•"/>
-                </a:pPr>
-                <a:r>
-                  <a:rPr lang="zh-CN" altLang="en-US" dirty="0"/>
-                  <a:t>自学、展学</a:t>
-                </a:r>
-              </a:p>
-              <a:p>
-                <a:pPr marL="285750" indent="-285750">
-                  <a:buFont typeface="Arial" panose="020B0604020202020204" pitchFamily="34" charset="0"/>
-                  <a:buChar char="•"/>
-                </a:pPr>
-                <a:endParaRPr lang="en-US" altLang="zh-CN" dirty="0"/>
-              </a:p>
-              <a:p>
-                <a:pPr marL="285750" indent="-285750">
-                  <a:buFont typeface="Arial" panose="020B0604020202020204" pitchFamily="34" charset="0"/>
-                  <a:buChar char="•"/>
-                </a:pPr>
-                <a:endParaRPr lang="en-US" altLang="zh-CN" dirty="0"/>
-              </a:p>
-              <a:p>
-                <a:pPr marL="285750" indent="-285750">
-                  <a:buFont typeface="Arial" panose="020B0604020202020204" pitchFamily="34" charset="0"/>
-                  <a:buChar char="•"/>
-                </a:pPr>
-                <a:endParaRPr lang="en-US" altLang="zh-CN" dirty="0"/>
-              </a:p>
-            </p:txBody>
-          </p:sp>
-        </mc:Choice>
-        <mc:Fallback>
-          <p:sp>
-            <p:nvSpPr>
-              <p:cNvPr id="2" name="文本占位符 1"/>
-              <p:cNvSpPr>
-                <a:spLocks noGrp="1" noRot="1" noChangeAspect="1" noMove="1" noResize="1" noEditPoints="1" noAdjustHandles="1" noChangeArrowheads="1" noChangeShapeType="1" noTextEdit="1"/>
-              </p:cNvSpPr>
-              <p:nvPr>
-                <p:ph type="body" idx="1"/>
-              </p:nvPr>
-            </p:nvSpPr>
-            <p:spPr>
-              <a:blipFill>
-                <a:blip r:embed="rId3"/>
-                <a:stretch>
-                  <a:fillRect/>
-                </a:stretch>
-              </a:blipFill>
-            </p:spPr>
-            <p:txBody>
-              <a:bodyPr/>
-              <a:lstStyle/>
-              <a:p>
-                <a:r>
-                  <a:rPr lang="zh-CN" altLang="en-US">
-                    <a:noFill/>
-                  </a:rPr>
-                  <a:t> </a:t>
-                </a:r>
-              </a:p>
-            </p:txBody>
-          </p:sp>
-        </mc:Fallback>
-      </mc:AlternateContent>
-      <p:sp>
-        <p:nvSpPr>
-          <p:cNvPr id="3" name="标题 2"/>
-          <p:cNvSpPr>
-            <a:spLocks noGrp="1"/>
-          </p:cNvSpPr>
-          <p:nvPr>
-            <p:ph type="title"/>
-          </p:nvPr>
-        </p:nvSpPr>
-        <p:spPr/>
-        <p:txBody>
-          <a:bodyPr/>
-          <a:lstStyle/>
-          <a:p>
-            <a:r>
-              <a:rPr lang="zh-CN" altLang="en-US" dirty="0">
-                <a:sym typeface="+mn-ea"/>
-              </a:rPr>
-              <a:t>主问题：如何推导</a:t>
-            </a:r>
-            <a:r>
-              <a:rPr lang="zh-CN" altLang="en-US" dirty="0"/>
-              <a:t>全连接层的后向传播？</a:t>
-            </a:r>
-          </a:p>
-        </p:txBody>
-      </p:sp>
-    </p:spTree>
-    <p:custDataLst>
-      <p:tags r:id="rId1"/>
-    </p:custDataLst>
-    <p:extLst>
-      <p:ext uri="{BB962C8B-B14F-4D97-AF65-F5344CB8AC3E}">
-        <p14:creationId xmlns:p14="http://schemas.microsoft.com/office/powerpoint/2010/main" val="1165925500"/>
-      </p:ext>
-    </p:extLst>
-  </p:cSld>
-  <p:clrMapOvr>
-    <a:masterClrMapping/>
-  </p:clrMapOvr>
-</p:sld>
-</file>
-
-<file path=ppt/slides/slide15.xml><?xml version="1.0" encoding="utf-8"?>
 <p:sld xmlns:a="http://schemas.openxmlformats.org/drawingml/2006/main" xmlns:r="http://schemas.openxmlformats.org/officeDocument/2006/relationships" xmlns:p="http://schemas.openxmlformats.org/presentationml/2006/main">
   <p:cSld>
     <p:spTree>
@@ -8373,7 +8174,7 @@
 </p:sld>
 </file>
 
-<file path=ppt/slides/slide16.xml><?xml version="1.0" encoding="utf-8"?>
+<file path=ppt/slides/slide15.xml><?xml version="1.0" encoding="utf-8"?>
 <p:sld xmlns:a="http://schemas.openxmlformats.org/drawingml/2006/main" xmlns:r="http://schemas.openxmlformats.org/officeDocument/2006/relationships" xmlns:p="http://schemas.openxmlformats.org/presentationml/2006/main">
   <p:cSld>
     <p:spTree>
@@ -8481,6 +8282,42 @@
           </a:prstGeom>
         </p:spPr>
       </p:pic>
+      <p:pic>
+        <p:nvPicPr>
+          <p:cNvPr id="9" name="图片 8">
+            <a:extLst>
+              <a:ext uri="{FF2B5EF4-FFF2-40B4-BE49-F238E27FC236}">
+                <a16:creationId xmlns:a16="http://schemas.microsoft.com/office/drawing/2014/main" id="{BF6E8693-4405-91C5-40E0-5CEBB752635D}"/>
+              </a:ext>
+            </a:extLst>
+          </p:cNvPr>
+          <p:cNvPicPr>
+            <a:picLocks noChangeAspect="1"/>
+          </p:cNvPicPr>
+          <p:nvPr/>
+        </p:nvPicPr>
+        <p:blipFill>
+          <a:blip r:embed="rId5">
+            <a:extLst>
+              <a:ext uri="{28A0092B-C50C-407E-A947-70E740481C1C}">
+                <a14:useLocalDpi xmlns:a14="http://schemas.microsoft.com/office/drawing/2010/main" val="0"/>
+              </a:ext>
+            </a:extLst>
+          </a:blip>
+          <a:stretch>
+            <a:fillRect/>
+          </a:stretch>
+        </p:blipFill>
+        <p:spPr>
+          <a:xfrm>
+            <a:off x="7881912" y="2252933"/>
+            <a:ext cx="3640207" cy="2352134"/>
+          </a:xfrm>
+          <a:prstGeom prst="rect">
+            <a:avLst/>
+          </a:prstGeom>
+        </p:spPr>
+      </p:pic>
     </p:spTree>
     <p:custDataLst>
       <p:tags r:id="rId1"/>
@@ -8488,6 +8325,224 @@
     <p:extLst>
       <p:ext uri="{BB962C8B-B14F-4D97-AF65-F5344CB8AC3E}">
         <p14:creationId xmlns:p14="http://schemas.microsoft.com/office/powerpoint/2010/main" val="733817897"/>
+      </p:ext>
+    </p:extLst>
+  </p:cSld>
+  <p:clrMapOvr>
+    <a:masterClrMapping/>
+  </p:clrMapOvr>
+</p:sld>
+</file>
+
+<file path=ppt/slides/slide16.xml><?xml version="1.0" encoding="utf-8"?>
+<p:sld xmlns:a="http://schemas.openxmlformats.org/drawingml/2006/main" xmlns:r="http://schemas.openxmlformats.org/officeDocument/2006/relationships" xmlns:p="http://schemas.openxmlformats.org/presentationml/2006/main">
+  <p:cSld>
+    <p:spTree>
+      <p:nvGrpSpPr>
+        <p:cNvPr id="1" name=""/>
+        <p:cNvGrpSpPr/>
+        <p:nvPr/>
+      </p:nvGrpSpPr>
+      <p:grpSpPr>
+        <a:xfrm>
+          <a:off x="0" y="0"/>
+          <a:ext cx="0" cy="0"/>
+          <a:chOff x="0" y="0"/>
+          <a:chExt cx="0" cy="0"/>
+        </a:xfrm>
+      </p:grpSpPr>
+      <p:sp>
+        <p:nvSpPr>
+          <p:cNvPr id="2" name="文本占位符 1"/>
+          <p:cNvSpPr>
+            <a:spLocks noGrp="1"/>
+          </p:cNvSpPr>
+          <p:nvPr>
+            <p:ph type="body" idx="1"/>
+          </p:nvPr>
+        </p:nvSpPr>
+        <p:spPr/>
+        <p:txBody>
+          <a:bodyPr/>
+          <a:lstStyle/>
+          <a:p>
+            <a:pPr marL="285750" indent="-285750">
+              <a:buFont typeface="Arial" panose="020B0604020202020204" pitchFamily="34" charset="0"/>
+              <a:buChar char="•"/>
+            </a:pPr>
+            <a:r>
+              <a:rPr lang="zh-CN" altLang="en-US" dirty="0"/>
+              <a:t>如何向量化输出层的误差项？</a:t>
+            </a:r>
+            <a:endParaRPr lang="en-US" altLang="zh-CN" dirty="0"/>
+          </a:p>
+          <a:p>
+            <a:br>
+              <a:rPr lang="zh-CN" altLang="en-US" dirty="0"/>
+            </a:br>
+            <a:endParaRPr lang="en-US" altLang="zh-CN" dirty="0"/>
+          </a:p>
+          <a:p>
+            <a:pPr marL="285750" indent="-285750">
+              <a:buFont typeface="Arial" panose="020B0604020202020204" pitchFamily="34" charset="0"/>
+              <a:buChar char="•"/>
+            </a:pPr>
+            <a:endParaRPr lang="en-US" altLang="zh-CN" dirty="0"/>
+          </a:p>
+          <a:p>
+            <a:pPr marL="285750" indent="-285750">
+              <a:buFont typeface="Arial" panose="020B0604020202020204" pitchFamily="34" charset="0"/>
+              <a:buChar char="•"/>
+            </a:pPr>
+            <a:endParaRPr lang="en-US" altLang="zh-CN" dirty="0"/>
+          </a:p>
+          <a:p>
+            <a:pPr marL="285750" indent="-285750">
+              <a:buFont typeface="Arial" panose="020B0604020202020204" pitchFamily="34" charset="0"/>
+              <a:buChar char="•"/>
+            </a:pPr>
+            <a:endParaRPr lang="en-US" altLang="zh-CN" dirty="0"/>
+          </a:p>
+          <a:p>
+            <a:pPr marL="285750" indent="-285750">
+              <a:buFont typeface="Arial" panose="020B0604020202020204" pitchFamily="34" charset="0"/>
+              <a:buChar char="•"/>
+            </a:pPr>
+            <a:r>
+              <a:rPr lang="zh-CN" altLang="en-US" dirty="0"/>
+              <a:t>自学、互学、展学</a:t>
+            </a:r>
+          </a:p>
+          <a:p>
+            <a:pPr marL="285750" indent="-285750">
+              <a:buFont typeface="Arial" panose="020B0604020202020204" pitchFamily="34" charset="0"/>
+              <a:buChar char="•"/>
+            </a:pPr>
+            <a:endParaRPr lang="en-US" altLang="zh-CN" dirty="0"/>
+          </a:p>
+          <a:p>
+            <a:pPr marL="285750" indent="-285750">
+              <a:buFont typeface="Arial" panose="020B0604020202020204" pitchFamily="34" charset="0"/>
+              <a:buChar char="•"/>
+            </a:pPr>
+            <a:endParaRPr lang="en-US" altLang="zh-CN" dirty="0"/>
+          </a:p>
+          <a:p>
+            <a:pPr marL="285750" indent="-285750">
+              <a:buFont typeface="Arial" panose="020B0604020202020204" pitchFamily="34" charset="0"/>
+              <a:buChar char="•"/>
+            </a:pPr>
+            <a:endParaRPr lang="en-US" altLang="zh-CN" dirty="0"/>
+          </a:p>
+        </p:txBody>
+      </p:sp>
+      <p:sp>
+        <p:nvSpPr>
+          <p:cNvPr id="3" name="标题 2"/>
+          <p:cNvSpPr>
+            <a:spLocks noGrp="1"/>
+          </p:cNvSpPr>
+          <p:nvPr>
+            <p:ph type="title"/>
+          </p:nvPr>
+        </p:nvSpPr>
+        <p:spPr/>
+        <p:txBody>
+          <a:bodyPr/>
+          <a:lstStyle/>
+          <a:p>
+            <a:r>
+              <a:rPr lang="zh-CN" altLang="en-US" dirty="0">
+                <a:sym typeface="+mn-ea"/>
+              </a:rPr>
+              <a:t>主问题：如何推导</a:t>
+            </a:r>
+            <a:r>
+              <a:rPr lang="zh-CN" altLang="en-US" dirty="0"/>
+              <a:t>全连接层的后向传播？</a:t>
+            </a:r>
+          </a:p>
+        </p:txBody>
+      </p:sp>
+      <p:pic>
+        <p:nvPicPr>
+          <p:cNvPr id="5" name="图片 4">
+            <a:extLst>
+              <a:ext uri="{FF2B5EF4-FFF2-40B4-BE49-F238E27FC236}">
+                <a16:creationId xmlns:a16="http://schemas.microsoft.com/office/drawing/2014/main" id="{C75BD8F3-A0F0-D54E-3E21-2368DE12F078}"/>
+              </a:ext>
+            </a:extLst>
+          </p:cNvPr>
+          <p:cNvPicPr>
+            <a:picLocks noChangeAspect="1"/>
+          </p:cNvPicPr>
+          <p:nvPr/>
+        </p:nvPicPr>
+        <p:blipFill>
+          <a:blip r:embed="rId3">
+            <a:extLst>
+              <a:ext uri="{28A0092B-C50C-407E-A947-70E740481C1C}">
+                <a14:useLocalDpi xmlns:a14="http://schemas.microsoft.com/office/drawing/2010/main" val="0"/>
+              </a:ext>
+            </a:extLst>
+          </a:blip>
+          <a:stretch>
+            <a:fillRect/>
+          </a:stretch>
+        </p:blipFill>
+        <p:spPr>
+          <a:xfrm>
+            <a:off x="7881912" y="2252933"/>
+            <a:ext cx="3640207" cy="2352134"/>
+          </a:xfrm>
+          <a:prstGeom prst="rect">
+            <a:avLst/>
+          </a:prstGeom>
+        </p:spPr>
+      </p:pic>
+      <p:pic>
+        <p:nvPicPr>
+          <p:cNvPr id="8" name="图片 7">
+            <a:extLst>
+              <a:ext uri="{FF2B5EF4-FFF2-40B4-BE49-F238E27FC236}">
+                <a16:creationId xmlns:a16="http://schemas.microsoft.com/office/drawing/2014/main" id="{E10E213D-9543-8EAC-B4AE-D0B024A9561F}"/>
+              </a:ext>
+            </a:extLst>
+          </p:cNvPr>
+          <p:cNvPicPr>
+            <a:picLocks noChangeAspect="1"/>
+          </p:cNvPicPr>
+          <p:nvPr/>
+        </p:nvPicPr>
+        <p:blipFill>
+          <a:blip r:embed="rId4">
+            <a:extLst>
+              <a:ext uri="{28A0092B-C50C-407E-A947-70E740481C1C}">
+                <a14:useLocalDpi xmlns:a14="http://schemas.microsoft.com/office/drawing/2010/main" val="0"/>
+              </a:ext>
+            </a:extLst>
+          </a:blip>
+          <a:stretch>
+            <a:fillRect/>
+          </a:stretch>
+        </p:blipFill>
+        <p:spPr>
+          <a:xfrm>
+            <a:off x="3890666" y="2432957"/>
+            <a:ext cx="1778000" cy="685800"/>
+          </a:xfrm>
+          <a:prstGeom prst="rect">
+            <a:avLst/>
+          </a:prstGeom>
+        </p:spPr>
+      </p:pic>
+    </p:spTree>
+    <p:custDataLst>
+      <p:tags r:id="rId1"/>
+    </p:custDataLst>
+    <p:extLst>
+      <p:ext uri="{BB962C8B-B14F-4D97-AF65-F5344CB8AC3E}">
+        <p14:creationId xmlns:p14="http://schemas.microsoft.com/office/powerpoint/2010/main" val="123697361"/>
       </p:ext>
     </p:extLst>
   </p:cSld>
@@ -8535,7 +8590,7 @@
             </a:pPr>
             <a:r>
               <a:rPr lang="zh-CN" altLang="en-US" dirty="0"/>
-              <a:t>如何推导隐藏层的误差项</a:t>
+              <a:t>如何推导隐藏层的误差项？</a:t>
             </a:r>
             <a:endParaRPr lang="en-US" altLang="zh-CN" dirty="0"/>
           </a:p>
@@ -8743,7 +8798,7 @@
         </p:blipFill>
         <p:spPr>
           <a:xfrm>
-            <a:off x="4013061" y="414618"/>
+            <a:off x="958362" y="374426"/>
             <a:ext cx="7883770" cy="6028764"/>
           </a:xfrm>
           <a:prstGeom prst="rect">
@@ -8753,10 +8808,10 @@
       </p:pic>
       <p:pic>
         <p:nvPicPr>
-          <p:cNvPr id="5" name="图片 4">
+          <p:cNvPr id="7" name="图片 6">
             <a:extLst>
               <a:ext uri="{FF2B5EF4-FFF2-40B4-BE49-F238E27FC236}">
-                <a16:creationId xmlns:a16="http://schemas.microsoft.com/office/drawing/2014/main" id="{ADCE856A-4B2E-35BF-76FD-842177EE35DA}"/>
+                <a16:creationId xmlns:a16="http://schemas.microsoft.com/office/drawing/2014/main" id="{B403864F-F15C-DE6A-3513-1ED6FE1AC387}"/>
               </a:ext>
             </a:extLst>
           </p:cNvPr>
@@ -8779,7 +8834,7 @@
         </p:blipFill>
         <p:spPr>
           <a:xfrm>
-            <a:off x="80386" y="1516482"/>
+            <a:off x="7881912" y="2252933"/>
             <a:ext cx="3640207" cy="2352134"/>
           </a:xfrm>
           <a:prstGeom prst="rect">
@@ -8841,7 +8896,287 @@
             </a:pPr>
             <a:r>
               <a:rPr lang="zh-CN" altLang="en-US" dirty="0"/>
-              <a:t>更新</a:t>
+              <a:t>如何向量化隐藏层的误差项？</a:t>
+            </a:r>
+            <a:endParaRPr lang="en-US" altLang="zh-CN" dirty="0"/>
+          </a:p>
+          <a:p>
+            <a:br>
+              <a:rPr lang="zh-CN" altLang="en-US" dirty="0"/>
+            </a:br>
+            <a:endParaRPr lang="en-US" altLang="zh-CN" dirty="0"/>
+          </a:p>
+          <a:p>
+            <a:pPr marL="285750" indent="-285750">
+              <a:buFont typeface="Arial" panose="020B0604020202020204" pitchFamily="34" charset="0"/>
+              <a:buChar char="•"/>
+            </a:pPr>
+            <a:endParaRPr lang="en-US" altLang="zh-CN" dirty="0"/>
+          </a:p>
+          <a:p>
+            <a:pPr marL="285750" indent="-285750">
+              <a:buFont typeface="Arial" panose="020B0604020202020204" pitchFamily="34" charset="0"/>
+              <a:buChar char="•"/>
+            </a:pPr>
+            <a:endParaRPr lang="en-US" altLang="zh-CN" dirty="0"/>
+          </a:p>
+          <a:p>
+            <a:pPr marL="285750" indent="-285750">
+              <a:buFont typeface="Arial" panose="020B0604020202020204" pitchFamily="34" charset="0"/>
+              <a:buChar char="•"/>
+            </a:pPr>
+            <a:endParaRPr lang="en-US" altLang="zh-CN" dirty="0"/>
+          </a:p>
+          <a:p>
+            <a:pPr marL="285750" indent="-285750">
+              <a:buFont typeface="Arial" panose="020B0604020202020204" pitchFamily="34" charset="0"/>
+              <a:buChar char="•"/>
+            </a:pPr>
+            <a:r>
+              <a:rPr lang="zh-CN" altLang="en-US" dirty="0"/>
+              <a:t>自学、互学、展学</a:t>
+            </a:r>
+          </a:p>
+          <a:p>
+            <a:pPr marL="285750" indent="-285750">
+              <a:buFont typeface="Arial" panose="020B0604020202020204" pitchFamily="34" charset="0"/>
+              <a:buChar char="•"/>
+            </a:pPr>
+            <a:endParaRPr lang="en-US" altLang="zh-CN" dirty="0"/>
+          </a:p>
+          <a:p>
+            <a:pPr marL="285750" indent="-285750">
+              <a:buFont typeface="Arial" panose="020B0604020202020204" pitchFamily="34" charset="0"/>
+              <a:buChar char="•"/>
+            </a:pPr>
+            <a:endParaRPr lang="en-US" altLang="zh-CN" dirty="0"/>
+          </a:p>
+          <a:p>
+            <a:pPr marL="285750" indent="-285750">
+              <a:buFont typeface="Arial" panose="020B0604020202020204" pitchFamily="34" charset="0"/>
+              <a:buChar char="•"/>
+            </a:pPr>
+            <a:endParaRPr lang="en-US" altLang="zh-CN" dirty="0"/>
+          </a:p>
+        </p:txBody>
+      </p:sp>
+      <p:sp>
+        <p:nvSpPr>
+          <p:cNvPr id="3" name="标题 2"/>
+          <p:cNvSpPr>
+            <a:spLocks noGrp="1"/>
+          </p:cNvSpPr>
+          <p:nvPr>
+            <p:ph type="title"/>
+          </p:nvPr>
+        </p:nvSpPr>
+        <p:spPr/>
+        <p:txBody>
+          <a:bodyPr/>
+          <a:lstStyle/>
+          <a:p>
+            <a:r>
+              <a:rPr lang="zh-CN" altLang="en-US" dirty="0">
+                <a:sym typeface="+mn-ea"/>
+              </a:rPr>
+              <a:t>主问题：如何推导</a:t>
+            </a:r>
+            <a:r>
+              <a:rPr lang="zh-CN" altLang="en-US" dirty="0"/>
+              <a:t>全连接层的后向传播？</a:t>
+            </a:r>
+          </a:p>
+        </p:txBody>
+      </p:sp>
+      <p:pic>
+        <p:nvPicPr>
+          <p:cNvPr id="4" name="图片 3">
+            <a:extLst>
+              <a:ext uri="{FF2B5EF4-FFF2-40B4-BE49-F238E27FC236}">
+                <a16:creationId xmlns:a16="http://schemas.microsoft.com/office/drawing/2014/main" id="{7DEA81A0-F073-C7D2-3C65-C1B2B7F3AA98}"/>
+              </a:ext>
+            </a:extLst>
+          </p:cNvPr>
+          <p:cNvPicPr>
+            <a:picLocks noChangeAspect="1"/>
+          </p:cNvPicPr>
+          <p:nvPr/>
+        </p:nvPicPr>
+        <p:blipFill>
+          <a:blip r:embed="rId3">
+            <a:extLst>
+              <a:ext uri="{28A0092B-C50C-407E-A947-70E740481C1C}">
+                <a14:useLocalDpi xmlns:a14="http://schemas.microsoft.com/office/drawing/2010/main" val="0"/>
+              </a:ext>
+            </a:extLst>
+          </a:blip>
+          <a:stretch>
+            <a:fillRect/>
+          </a:stretch>
+        </p:blipFill>
+        <p:spPr>
+          <a:xfrm>
+            <a:off x="7881912" y="2252933"/>
+            <a:ext cx="3640207" cy="2352134"/>
+          </a:xfrm>
+          <a:prstGeom prst="rect">
+            <a:avLst/>
+          </a:prstGeom>
+        </p:spPr>
+      </p:pic>
+      <p:pic>
+        <p:nvPicPr>
+          <p:cNvPr id="6" name="图片 5">
+            <a:extLst>
+              <a:ext uri="{FF2B5EF4-FFF2-40B4-BE49-F238E27FC236}">
+                <a16:creationId xmlns:a16="http://schemas.microsoft.com/office/drawing/2014/main" id="{3F58A770-6B13-539A-A16F-134626D715C4}"/>
+              </a:ext>
+            </a:extLst>
+          </p:cNvPr>
+          <p:cNvPicPr>
+            <a:picLocks noChangeAspect="1"/>
+          </p:cNvPicPr>
+          <p:nvPr/>
+        </p:nvPicPr>
+        <p:blipFill>
+          <a:blip r:embed="rId4">
+            <a:extLst>
+              <a:ext uri="{28A0092B-C50C-407E-A947-70E740481C1C}">
+                <a14:useLocalDpi xmlns:a14="http://schemas.microsoft.com/office/drawing/2010/main" val="0"/>
+              </a:ext>
+            </a:extLst>
+          </a:blip>
+          <a:stretch>
+            <a:fillRect/>
+          </a:stretch>
+        </p:blipFill>
+        <p:spPr>
+          <a:xfrm>
+            <a:off x="2903136" y="2279650"/>
+            <a:ext cx="4114800" cy="2298700"/>
+          </a:xfrm>
+          <a:prstGeom prst="rect">
+            <a:avLst/>
+          </a:prstGeom>
+        </p:spPr>
+      </p:pic>
+    </p:spTree>
+    <p:custDataLst>
+      <p:tags r:id="rId1"/>
+    </p:custDataLst>
+    <p:extLst>
+      <p:ext uri="{BB962C8B-B14F-4D97-AF65-F5344CB8AC3E}">
+        <p14:creationId xmlns:p14="http://schemas.microsoft.com/office/powerpoint/2010/main" val="3155368487"/>
+      </p:ext>
+    </p:extLst>
+  </p:cSld>
+  <p:clrMapOvr>
+    <a:masterClrMapping/>
+  </p:clrMapOvr>
+</p:sld>
+</file>
+
+<file path=ppt/slides/slide2.xml><?xml version="1.0" encoding="utf-8"?>
+<p:sld xmlns:a="http://schemas.openxmlformats.org/drawingml/2006/main" xmlns:r="http://schemas.openxmlformats.org/officeDocument/2006/relationships" xmlns:p="http://schemas.openxmlformats.org/presentationml/2006/main">
+  <p:cSld>
+    <p:spTree>
+      <p:nvGrpSpPr>
+        <p:cNvPr id="1" name=""/>
+        <p:cNvGrpSpPr/>
+        <p:nvPr/>
+      </p:nvGrpSpPr>
+      <p:grpSpPr>
+        <a:xfrm>
+          <a:off x="0" y="0"/>
+          <a:ext cx="0" cy="0"/>
+          <a:chOff x="0" y="0"/>
+          <a:chExt cx="0" cy="0"/>
+        </a:xfrm>
+      </p:grpSpPr>
+      <p:sp>
+        <p:nvSpPr>
+          <p:cNvPr id="2" name="标题 1"/>
+          <p:cNvSpPr>
+            <a:spLocks noGrp="1"/>
+          </p:cNvSpPr>
+          <p:nvPr>
+            <p:ph type="title"/>
+          </p:nvPr>
+        </p:nvSpPr>
+        <p:spPr>
+          <a:xfrm>
+            <a:off x="669882" y="2108221"/>
+            <a:ext cx="10852237" cy="899167"/>
+          </a:xfrm>
+        </p:spPr>
+        <p:txBody>
+          <a:bodyPr/>
+          <a:lstStyle/>
+          <a:p>
+            <a:r>
+              <a:rPr lang="zh-CN" altLang="en-US" dirty="0"/>
+              <a:t>第三节课：</a:t>
+            </a:r>
+            <a:br>
+              <a:rPr lang="en-US" altLang="zh-CN" dirty="0"/>
+            </a:br>
+            <a:r>
+              <a:rPr lang="zh-CN" altLang="en-US" dirty="0"/>
+              <a:t>全连接层的前向和后向传播推导（下）</a:t>
+            </a:r>
+          </a:p>
+        </p:txBody>
+      </p:sp>
+    </p:spTree>
+    <p:custDataLst>
+      <p:tags r:id="rId1"/>
+    </p:custDataLst>
+  </p:cSld>
+  <p:clrMapOvr>
+    <a:masterClrMapping/>
+  </p:clrMapOvr>
+</p:sld>
+</file>
+
+<file path=ppt/slides/slide20.xml><?xml version="1.0" encoding="utf-8"?>
+<p:sld xmlns:a="http://schemas.openxmlformats.org/drawingml/2006/main" xmlns:r="http://schemas.openxmlformats.org/officeDocument/2006/relationships" xmlns:p="http://schemas.openxmlformats.org/presentationml/2006/main">
+  <p:cSld>
+    <p:spTree>
+      <p:nvGrpSpPr>
+        <p:cNvPr id="1" name=""/>
+        <p:cNvGrpSpPr/>
+        <p:nvPr/>
+      </p:nvGrpSpPr>
+      <p:grpSpPr>
+        <a:xfrm>
+          <a:off x="0" y="0"/>
+          <a:ext cx="0" cy="0"/>
+          <a:chOff x="0" y="0"/>
+          <a:chExt cx="0" cy="0"/>
+        </a:xfrm>
+      </p:grpSpPr>
+      <p:sp>
+        <p:nvSpPr>
+          <p:cNvPr id="2" name="文本占位符 1"/>
+          <p:cNvSpPr>
+            <a:spLocks noGrp="1"/>
+          </p:cNvSpPr>
+          <p:nvPr>
+            <p:ph type="body" idx="1"/>
+          </p:nvPr>
+        </p:nvSpPr>
+        <p:spPr/>
+        <p:txBody>
+          <a:bodyPr/>
+          <a:lstStyle/>
+          <a:p>
+            <a:pPr marL="285750" indent="-285750">
+              <a:buFont typeface="Arial" panose="020B0604020202020204" pitchFamily="34" charset="0"/>
+              <a:buChar char="•"/>
+            </a:pPr>
+            <a:r>
+              <a:rPr lang="zh-CN" altLang="en-US" dirty="0"/>
+              <a:t>如何更新</a:t>
             </a:r>
             <a:r>
               <a:rPr lang="zh-CN" altLang="en-US" b="0" i="0" dirty="0">
@@ -8851,22 +9186,7 @@
                 <a:effectLst/>
                 <a:latin typeface="verdana" panose="020B0604030504040204" pitchFamily="34" charset="0"/>
               </a:rPr>
-              <a:t>输出层的</a:t>
-            </a:r>
-            <a:r>
-              <a:rPr lang="zh-CN" altLang="en-US" dirty="0"/>
-              <a:t>梯度下降算法</a:t>
-            </a:r>
-            <a:endParaRPr lang="en-US" altLang="zh-CN" dirty="0"/>
-          </a:p>
-          <a:p>
-            <a:pPr marL="285750" indent="-285750">
-              <a:buFont typeface="Arial" panose="020B0604020202020204" pitchFamily="34" charset="0"/>
-              <a:buChar char="•"/>
-            </a:pPr>
-            <a:r>
-              <a:rPr lang="zh-CN" altLang="en-US" dirty="0"/>
-              <a:t>更新</a:t>
+              <a:t>输出层和</a:t>
             </a:r>
             <a:r>
               <a:rPr lang="zh-CN" altLang="en-US" dirty="0">
@@ -8889,8 +9209,59 @@
             </a:r>
             <a:r>
               <a:rPr lang="zh-CN" altLang="en-US" dirty="0"/>
-              <a:t>梯度下降算法</a:t>
-            </a:r>
+              <a:t>梯度下降算法？</a:t>
+            </a:r>
+            <a:endParaRPr lang="en-US" altLang="zh-CN" dirty="0"/>
+          </a:p>
+          <a:p>
+            <a:pPr marL="285750" indent="-285750">
+              <a:buFont typeface="Arial" panose="020B0604020202020204" pitchFamily="34" charset="0"/>
+              <a:buChar char="•"/>
+            </a:pPr>
+            <a:r>
+              <a:rPr lang="zh-CN" altLang="en-US" dirty="0"/>
+              <a:t>如何向量化</a:t>
+            </a:r>
+            <a:r>
+              <a:rPr lang="zh-CN" altLang="en-US" b="0" i="0" dirty="0">
+                <a:solidFill>
+                  <a:srgbClr val="333333"/>
+                </a:solidFill>
+                <a:effectLst/>
+                <a:latin typeface="verdana" panose="020B0604030504040204" pitchFamily="34" charset="0"/>
+              </a:rPr>
+              <a:t>输出层和</a:t>
+            </a:r>
+            <a:r>
+              <a:rPr lang="zh-CN" altLang="en-US" dirty="0">
+                <a:solidFill>
+                  <a:srgbClr val="333333"/>
+                </a:solidFill>
+                <a:latin typeface="verdana" panose="020B0604030504040204" pitchFamily="34" charset="0"/>
+              </a:rPr>
+              <a:t>隐藏</a:t>
+            </a:r>
+            <a:r>
+              <a:rPr lang="zh-CN" altLang="en-US" b="0" i="0" dirty="0">
+                <a:solidFill>
+                  <a:srgbClr val="333333"/>
+                </a:solidFill>
+                <a:effectLst/>
+                <a:latin typeface="verdana" panose="020B0604030504040204" pitchFamily="34" charset="0"/>
+              </a:rPr>
+              <a:t>层的</a:t>
+            </a:r>
+            <a:r>
+              <a:rPr lang="zh-CN" altLang="en-US" dirty="0"/>
+              <a:t>梯度下降算法？</a:t>
+            </a:r>
+            <a:endParaRPr lang="en-US" altLang="zh-CN" dirty="0"/>
+          </a:p>
+          <a:p>
+            <a:pPr marL="285750" indent="-285750">
+              <a:buFont typeface="Arial" panose="020B0604020202020204" pitchFamily="34" charset="0"/>
+              <a:buChar char="•"/>
+            </a:pPr>
             <a:endParaRPr lang="en-US" altLang="zh-CN" dirty="0"/>
           </a:p>
           <a:p>
@@ -9043,7 +9414,7 @@
         </p:blipFill>
         <p:spPr>
           <a:xfrm>
-            <a:off x="5147058" y="1626235"/>
+            <a:off x="5789105" y="1459363"/>
             <a:ext cx="2400300" cy="584200"/>
           </a:xfrm>
           <a:prstGeom prst="rect">
@@ -9079,8 +9450,152 @@
         </p:blipFill>
         <p:spPr>
           <a:xfrm>
-            <a:off x="5103515" y="2210435"/>
+            <a:off x="5770175" y="1988320"/>
             <a:ext cx="2311400" cy="558800"/>
+          </a:xfrm>
+          <a:prstGeom prst="rect">
+            <a:avLst/>
+          </a:prstGeom>
+        </p:spPr>
+      </p:pic>
+      <p:pic>
+        <p:nvPicPr>
+          <p:cNvPr id="16" name="图片 15">
+            <a:extLst>
+              <a:ext uri="{FF2B5EF4-FFF2-40B4-BE49-F238E27FC236}">
+                <a16:creationId xmlns:a16="http://schemas.microsoft.com/office/drawing/2014/main" id="{D269BFC0-B4CA-75D7-0A10-F756FA9533FD}"/>
+              </a:ext>
+            </a:extLst>
+          </p:cNvPr>
+          <p:cNvPicPr>
+            <a:picLocks noChangeAspect="1"/>
+          </p:cNvPicPr>
+          <p:nvPr/>
+        </p:nvPicPr>
+        <p:blipFill>
+          <a:blip r:embed="rId6">
+            <a:extLst>
+              <a:ext uri="{28A0092B-C50C-407E-A947-70E740481C1C}">
+                <a14:useLocalDpi xmlns:a14="http://schemas.microsoft.com/office/drawing/2010/main" val="0"/>
+              </a:ext>
+            </a:extLst>
+          </a:blip>
+          <a:stretch>
+            <a:fillRect/>
+          </a:stretch>
+        </p:blipFill>
+        <p:spPr>
+          <a:xfrm>
+            <a:off x="6081325" y="2752135"/>
+            <a:ext cx="1689100" cy="762000"/>
+          </a:xfrm>
+          <a:prstGeom prst="rect">
+            <a:avLst/>
+          </a:prstGeom>
+        </p:spPr>
+      </p:pic>
+      <p:pic>
+        <p:nvPicPr>
+          <p:cNvPr id="17" name="图片 16">
+            <a:extLst>
+              <a:ext uri="{FF2B5EF4-FFF2-40B4-BE49-F238E27FC236}">
+                <a16:creationId xmlns:a16="http://schemas.microsoft.com/office/drawing/2014/main" id="{6BDA8B97-2151-C22F-841E-8C38A7A035B2}"/>
+              </a:ext>
+            </a:extLst>
+          </p:cNvPr>
+          <p:cNvPicPr>
+            <a:picLocks noChangeAspect="1"/>
+          </p:cNvPicPr>
+          <p:nvPr/>
+        </p:nvPicPr>
+        <p:blipFill>
+          <a:blip r:embed="rId7">
+            <a:extLst>
+              <a:ext uri="{28A0092B-C50C-407E-A947-70E740481C1C}">
+                <a14:useLocalDpi xmlns:a14="http://schemas.microsoft.com/office/drawing/2010/main" val="0"/>
+              </a:ext>
+            </a:extLst>
+          </a:blip>
+          <a:stretch>
+            <a:fillRect/>
+          </a:stretch>
+        </p:blipFill>
+        <p:spPr>
+          <a:xfrm>
+            <a:off x="8189405" y="3418952"/>
+            <a:ext cx="3640207" cy="2352134"/>
+          </a:xfrm>
+          <a:prstGeom prst="rect">
+            <a:avLst/>
+          </a:prstGeom>
+        </p:spPr>
+      </p:pic>
+      <p:pic>
+        <p:nvPicPr>
+          <p:cNvPr id="7" name="图片 6">
+            <a:extLst>
+              <a:ext uri="{FF2B5EF4-FFF2-40B4-BE49-F238E27FC236}">
+                <a16:creationId xmlns:a16="http://schemas.microsoft.com/office/drawing/2014/main" id="{2AC5D996-A895-0AE5-7268-43AB37A1C050}"/>
+              </a:ext>
+            </a:extLst>
+          </p:cNvPr>
+          <p:cNvPicPr>
+            <a:picLocks noChangeAspect="1"/>
+          </p:cNvPicPr>
+          <p:nvPr/>
+        </p:nvPicPr>
+        <p:blipFill>
+          <a:blip r:embed="rId8">
+            <a:extLst>
+              <a:ext uri="{28A0092B-C50C-407E-A947-70E740481C1C}">
+                <a14:useLocalDpi xmlns:a14="http://schemas.microsoft.com/office/drawing/2010/main" val="0"/>
+              </a:ext>
+            </a:extLst>
+          </a:blip>
+          <a:stretch>
+            <a:fillRect/>
+          </a:stretch>
+        </p:blipFill>
+        <p:spPr>
+          <a:xfrm>
+            <a:off x="2394173" y="2812252"/>
+            <a:ext cx="2933470" cy="1571147"/>
+          </a:xfrm>
+          <a:prstGeom prst="rect">
+            <a:avLst/>
+          </a:prstGeom>
+        </p:spPr>
+      </p:pic>
+      <p:pic>
+        <p:nvPicPr>
+          <p:cNvPr id="10" name="图片 9">
+            <a:extLst>
+              <a:ext uri="{FF2B5EF4-FFF2-40B4-BE49-F238E27FC236}">
+                <a16:creationId xmlns:a16="http://schemas.microsoft.com/office/drawing/2014/main" id="{ADD43434-0AAF-DADB-9FE3-83E469E804CD}"/>
+              </a:ext>
+            </a:extLst>
+          </p:cNvPr>
+          <p:cNvPicPr>
+            <a:picLocks noChangeAspect="1"/>
+          </p:cNvPicPr>
+          <p:nvPr/>
+        </p:nvPicPr>
+        <p:blipFill>
+          <a:blip r:embed="rId9">
+            <a:extLst>
+              <a:ext uri="{28A0092B-C50C-407E-A947-70E740481C1C}">
+                <a14:useLocalDpi xmlns:a14="http://schemas.microsoft.com/office/drawing/2010/main" val="0"/>
+              </a:ext>
+            </a:extLst>
+          </a:blip>
+          <a:stretch>
+            <a:fillRect/>
+          </a:stretch>
+        </p:blipFill>
+        <p:spPr>
+          <a:xfrm>
+            <a:off x="4873976" y="4648531"/>
+            <a:ext cx="2414698" cy="1867974"/>
           </a:xfrm>
           <a:prstGeom prst="rect">
             <a:avLst/>
@@ -9093,7 +9608,7 @@
     </p:custDataLst>
     <p:extLst>
       <p:ext uri="{BB962C8B-B14F-4D97-AF65-F5344CB8AC3E}">
-        <p14:creationId xmlns:p14="http://schemas.microsoft.com/office/powerpoint/2010/main" val="2915200876"/>
+        <p14:creationId xmlns:p14="http://schemas.microsoft.com/office/powerpoint/2010/main" val="2655851473"/>
       </p:ext>
     </p:extLst>
   </p:cSld>
@@ -9103,69 +9618,7 @@
 </p:sld>
 </file>
 
-<file path=ppt/slides/slide2.xml><?xml version="1.0" encoding="utf-8"?>
-<p:sld xmlns:a="http://schemas.openxmlformats.org/drawingml/2006/main" xmlns:r="http://schemas.openxmlformats.org/officeDocument/2006/relationships" xmlns:p="http://schemas.openxmlformats.org/presentationml/2006/main">
-  <p:cSld>
-    <p:spTree>
-      <p:nvGrpSpPr>
-        <p:cNvPr id="1" name=""/>
-        <p:cNvGrpSpPr/>
-        <p:nvPr/>
-      </p:nvGrpSpPr>
-      <p:grpSpPr>
-        <a:xfrm>
-          <a:off x="0" y="0"/>
-          <a:ext cx="0" cy="0"/>
-          <a:chOff x="0" y="0"/>
-          <a:chExt cx="0" cy="0"/>
-        </a:xfrm>
-      </p:grpSpPr>
-      <p:sp>
-        <p:nvSpPr>
-          <p:cNvPr id="2" name="标题 1"/>
-          <p:cNvSpPr>
-            <a:spLocks noGrp="1"/>
-          </p:cNvSpPr>
-          <p:nvPr>
-            <p:ph type="title"/>
-          </p:nvPr>
-        </p:nvSpPr>
-        <p:spPr>
-          <a:xfrm>
-            <a:off x="669882" y="2108221"/>
-            <a:ext cx="10852237" cy="899167"/>
-          </a:xfrm>
-        </p:spPr>
-        <p:txBody>
-          <a:bodyPr/>
-          <a:lstStyle/>
-          <a:p>
-            <a:r>
-              <a:rPr lang="zh-CN" altLang="en-US" dirty="0"/>
-              <a:t>第三节课：</a:t>
-            </a:r>
-            <a:br>
-              <a:rPr lang="en-US" altLang="zh-CN" dirty="0"/>
-            </a:br>
-            <a:r>
-              <a:rPr lang="zh-CN" altLang="en-US" dirty="0"/>
-              <a:t>全连接层的前向和后向传播推导（下）</a:t>
-            </a:r>
-          </a:p>
-        </p:txBody>
-      </p:sp>
-    </p:spTree>
-    <p:custDataLst>
-      <p:tags r:id="rId1"/>
-    </p:custDataLst>
-  </p:cSld>
-  <p:clrMapOvr>
-    <a:masterClrMapping/>
-  </p:clrMapOvr>
-</p:sld>
-</file>
-
-<file path=ppt/slides/slide20.xml><?xml version="1.0" encoding="utf-8"?>
+<file path=ppt/slides/slide21.xml><?xml version="1.0" encoding="utf-8"?>
 <p:sld xmlns:a="http://schemas.openxmlformats.org/drawingml/2006/main" xmlns:r="http://schemas.openxmlformats.org/officeDocument/2006/relationships" xmlns:p="http://schemas.openxmlformats.org/presentationml/2006/main">
   <p:cSld>
     <p:spTree>
@@ -9289,8 +9742,8 @@
         </p:nvSpPr>
         <p:spPr>
           <a:xfrm>
-            <a:off x="2341267" y="3244334"/>
-            <a:ext cx="9495692" cy="369332"/>
+            <a:off x="1999622" y="3244334"/>
+            <a:ext cx="9837337" cy="369332"/>
           </a:xfrm>
           <a:prstGeom prst="rect">
             <a:avLst/>
@@ -9311,7 +9764,7 @@
                 <a:effectLst/>
                 <a:latin typeface="verdana" panose="020B0604030504040204" pitchFamily="34" charset="0"/>
               </a:rPr>
-              <a:t>需要先计算输出层的误差项，然后反向依次计算每层的误差项，直到与输入层相连的层</a:t>
+              <a:t>先计算输出层的误差项和梯度，然后反向依次计算每层的误差项和梯度，直到与输入层相连的层</a:t>
             </a:r>
             <a:endParaRPr kumimoji="1" lang="zh-CN" altLang="en-US" dirty="0"/>
           </a:p>
@@ -9412,7 +9865,7 @@
 </p:sld>
 </file>
 
-<file path=ppt/slides/slide21.xml><?xml version="1.0" encoding="utf-8"?>
+<file path=ppt/slides/slide22.xml><?xml version="1.0" encoding="utf-8"?>
 <p:sld xmlns:a="http://schemas.openxmlformats.org/drawingml/2006/main" xmlns:r="http://schemas.openxmlformats.org/officeDocument/2006/relationships" xmlns:p="http://schemas.openxmlformats.org/presentationml/2006/main">
   <p:cSld>
     <p:spTree>
@@ -9456,7 +9909,15 @@
             </a:r>
             <a:r>
               <a:rPr lang="zh-CN" altLang="en-US" dirty="0"/>
-              <a:t>全连接层的后向传播的代码</a:t>
+              <a:t>全连接层的后向传播的代码（损失函数和激活函数与判断性别</a:t>
+            </a:r>
+            <a:r>
+              <a:rPr lang="en-US" altLang="zh-CN" dirty="0"/>
+              <a:t>Demo</a:t>
+            </a:r>
+            <a:r>
+              <a:rPr lang="zh-CN" altLang="en-US" dirty="0"/>
+              <a:t>一样）</a:t>
             </a:r>
             <a:endParaRPr lang="en-US" altLang="zh-CN" dirty="0">
               <a:sym typeface="+mn-ea"/>
@@ -9471,6 +9932,45 @@
               <a:rPr lang="zh-CN" altLang="en-US" dirty="0"/>
               <a:t>使用下图的神经网络结构，运行代码</a:t>
             </a:r>
+            <a:endParaRPr lang="en-US" altLang="zh-CN" dirty="0"/>
+          </a:p>
+          <a:p>
+            <a:pPr marL="285750" indent="-285750">
+              <a:buFont typeface="Arial" panose="020B0604020202020204" pitchFamily="34" charset="0"/>
+              <a:buChar char="•"/>
+            </a:pPr>
+            <a:endParaRPr lang="en-US" altLang="zh-CN" dirty="0">
+              <a:sym typeface="+mn-ea"/>
+            </a:endParaRPr>
+          </a:p>
+          <a:p>
+            <a:pPr marL="285750" indent="-285750">
+              <a:buFont typeface="Arial" panose="020B0604020202020204" pitchFamily="34" charset="0"/>
+              <a:buChar char="•"/>
+            </a:pPr>
+            <a:r>
+              <a:rPr lang="en-US" altLang="zh-CN" dirty="0"/>
+              <a:t>TODO </a:t>
+            </a:r>
+            <a:r>
+              <a:rPr lang="zh-CN" altLang="en-US" dirty="0"/>
+              <a:t>请使用下图的神经网络结构，实现后向传播的代码（损失函数和激活函数与判断性别</a:t>
+            </a:r>
+            <a:r>
+              <a:rPr lang="en-US" altLang="zh-CN" dirty="0"/>
+              <a:t>Demo</a:t>
+            </a:r>
+            <a:r>
+              <a:rPr lang="zh-CN" altLang="en-US" dirty="0"/>
+              <a:t>一样）</a:t>
+            </a:r>
+            <a:endParaRPr lang="en-US" altLang="zh-CN" dirty="0"/>
+          </a:p>
+          <a:p>
+            <a:pPr marL="285750" indent="-285750">
+              <a:buFont typeface="Arial" panose="020B0604020202020204" pitchFamily="34" charset="0"/>
+              <a:buChar char="•"/>
+            </a:pPr>
             <a:endParaRPr lang="zh-CN" altLang="en-US" dirty="0">
               <a:sym typeface="+mn-ea"/>
             </a:endParaRPr>
@@ -9560,7 +10060,7 @@
         </p:blipFill>
         <p:spPr bwMode="auto">
           <a:xfrm>
-            <a:off x="5890099" y="2054741"/>
+            <a:off x="6704016" y="2389878"/>
             <a:ext cx="4680766" cy="3026298"/>
           </a:xfrm>
           <a:prstGeom prst="rect">
@@ -9576,6 +10076,42 @@
               </a14:hiddenFill>
             </a:ext>
           </a:extLst>
+        </p:spPr>
+      </p:pic>
+      <p:pic>
+        <p:nvPicPr>
+          <p:cNvPr id="5" name="图片 4">
+            <a:extLst>
+              <a:ext uri="{FF2B5EF4-FFF2-40B4-BE49-F238E27FC236}">
+                <a16:creationId xmlns:a16="http://schemas.microsoft.com/office/drawing/2014/main" id="{98833659-BC4A-FD05-31EC-47CAE8C0F8D0}"/>
+              </a:ext>
+            </a:extLst>
+          </p:cNvPr>
+          <p:cNvPicPr>
+            <a:picLocks noChangeAspect="1"/>
+          </p:cNvPicPr>
+          <p:nvPr/>
+        </p:nvPicPr>
+        <p:blipFill>
+          <a:blip r:embed="rId4">
+            <a:extLst>
+              <a:ext uri="{28A0092B-C50C-407E-A947-70E740481C1C}">
+                <a14:useLocalDpi xmlns:a14="http://schemas.microsoft.com/office/drawing/2010/main" val="0"/>
+              </a:ext>
+            </a:extLst>
+          </a:blip>
+          <a:stretch>
+            <a:fillRect/>
+          </a:stretch>
+        </p:blipFill>
+        <p:spPr>
+          <a:xfrm>
+            <a:off x="1415234" y="3953680"/>
+            <a:ext cx="4680766" cy="780128"/>
+          </a:xfrm>
+          <a:prstGeom prst="rect">
+            <a:avLst/>
+          </a:prstGeom>
         </p:spPr>
       </p:pic>
     </p:spTree>
@@ -9723,6 +10259,55 @@
                                           </p:stCondLst>
                                         </p:cTn>
                                         <p:tgtEl>
+                                          <p:spTgt spid="2">
+                                            <p:txEl>
+                                              <p:pRg st="3" end="3"/>
+                                            </p:txEl>
+                                          </p:spTgt>
+                                        </p:tgtEl>
+                                        <p:attrNameLst>
+                                          <p:attrName>style.visibility</p:attrName>
+                                        </p:attrNameLst>
+                                      </p:cBhvr>
+                                      <p:to>
+                                        <p:strVal val="visible"/>
+                                      </p:to>
+                                    </p:set>
+                                  </p:childTnLst>
+                                </p:cTn>
+                              </p:par>
+                            </p:childTnLst>
+                          </p:cTn>
+                        </p:par>
+                      </p:childTnLst>
+                    </p:cTn>
+                  </p:par>
+                  <p:par>
+                    <p:cTn id="15" fill="hold">
+                      <p:stCondLst>
+                        <p:cond delay="indefinite"/>
+                      </p:stCondLst>
+                      <p:childTnLst>
+                        <p:par>
+                          <p:cTn id="16" fill="hold">
+                            <p:stCondLst>
+                              <p:cond delay="0"/>
+                            </p:stCondLst>
+                            <p:childTnLst>
+                              <p:par>
+                                <p:cTn id="17" presetID="1" presetClass="entr" presetSubtype="0" fill="hold" nodeType="clickEffect">
+                                  <p:stCondLst>
+                                    <p:cond delay="0"/>
+                                  </p:stCondLst>
+                                  <p:childTnLst>
+                                    <p:set>
+                                      <p:cBhvr>
+                                        <p:cTn id="18" dur="1" fill="hold">
+                                          <p:stCondLst>
+                                            <p:cond delay="0"/>
+                                          </p:stCondLst>
+                                        </p:cTn>
+                                        <p:tgtEl>
                                           <p:spTgt spid="4"/>
                                         </p:tgtEl>
                                         <p:attrNameLst>
@@ -9767,7 +10352,7 @@
 </p:sld>
 </file>
 
-<file path=ppt/slides/slide22.xml><?xml version="1.0" encoding="utf-8"?>
+<file path=ppt/slides/slide23.xml><?xml version="1.0" encoding="utf-8"?>
 <p:sld xmlns:a="http://schemas.openxmlformats.org/drawingml/2006/main" xmlns:r="http://schemas.openxmlformats.org/officeDocument/2006/relationships" xmlns:p="http://schemas.openxmlformats.org/presentationml/2006/main">
   <p:cSld>
     <p:spTree>
@@ -9836,7 +10421,7 @@
 </p:sld>
 </file>
 
-<file path=ppt/slides/slide23.xml><?xml version="1.0" encoding="utf-8"?>
+<file path=ppt/slides/slide24.xml><?xml version="1.0" encoding="utf-8"?>
 <p:sld xmlns:a="http://schemas.openxmlformats.org/drawingml/2006/main" xmlns:r="http://schemas.openxmlformats.org/officeDocument/2006/relationships" xmlns:p="http://schemas.openxmlformats.org/presentationml/2006/main">
   <p:cSld>
     <p:spTree>
@@ -10156,7 +10741,7 @@
 </p:sld>
 </file>
 
-<file path=ppt/slides/slide24.xml><?xml version="1.0" encoding="utf-8"?>
+<file path=ppt/slides/slide25.xml><?xml version="1.0" encoding="utf-8"?>
 <p:sld xmlns:a="http://schemas.openxmlformats.org/drawingml/2006/main" xmlns:r="http://schemas.openxmlformats.org/officeDocument/2006/relationships" xmlns:p="http://schemas.openxmlformats.org/presentationml/2006/main">
   <p:cSld>
     <p:spTree>
@@ -10206,7 +10791,7 @@
 </p:sld>
 </file>
 
-<file path=ppt/slides/slide25.xml><?xml version="1.0" encoding="utf-8"?>
+<file path=ppt/slides/slide26.xml><?xml version="1.0" encoding="utf-8"?>
 <p:sld xmlns:a="http://schemas.openxmlformats.org/drawingml/2006/main" xmlns:r="http://schemas.openxmlformats.org/officeDocument/2006/relationships" xmlns:p="http://schemas.openxmlformats.org/presentationml/2006/main">
   <p:cSld>
     <p:spTree>
@@ -10372,7 +10957,7 @@
 </p:sld>
 </file>
 
-<file path=ppt/slides/slide26.xml><?xml version="1.0" encoding="utf-8"?>
+<file path=ppt/slides/slide27.xml><?xml version="1.0" encoding="utf-8"?>
 <p:sld xmlns:a="http://schemas.openxmlformats.org/drawingml/2006/main" xmlns:r="http://schemas.openxmlformats.org/officeDocument/2006/relationships" xmlns:p="http://schemas.openxmlformats.org/presentationml/2006/main">
   <p:cSld>
     <p:spTree>
@@ -10507,7 +11092,7 @@
 </p:sld>
 </file>
 
-<file path=ppt/slides/slide27.xml><?xml version="1.0" encoding="utf-8"?>
+<file path=ppt/slides/slide28.xml><?xml version="1.0" encoding="utf-8"?>
 <p:sld xmlns:a="http://schemas.openxmlformats.org/drawingml/2006/main" xmlns:r="http://schemas.openxmlformats.org/officeDocument/2006/relationships" xmlns:p="http://schemas.openxmlformats.org/presentationml/2006/main">
   <p:cSld>
     <p:spTree>
@@ -10586,34 +11171,6 @@
 </p:sld>
 </file>
 
-<file path=ppt/slides/slide28.xml><?xml version="1.0" encoding="utf-8"?>
-<p:sld xmlns:a="http://schemas.openxmlformats.org/drawingml/2006/main" xmlns:r="http://schemas.openxmlformats.org/officeDocument/2006/relationships" xmlns:p="http://schemas.openxmlformats.org/presentationml/2006/main">
-  <p:cSld>
-    <p:spTree>
-      <p:nvGrpSpPr>
-        <p:cNvPr id="1" name=""/>
-        <p:cNvGrpSpPr/>
-        <p:nvPr/>
-      </p:nvGrpSpPr>
-      <p:grpSpPr>
-        <a:xfrm>
-          <a:off x="0" y="0"/>
-          <a:ext cx="0" cy="0"/>
-          <a:chOff x="0" y="0"/>
-          <a:chExt cx="0" cy="0"/>
-        </a:xfrm>
-      </p:grpSpPr>
-    </p:spTree>
-    <p:custDataLst>
-      <p:tags r:id="rId1"/>
-    </p:custDataLst>
-  </p:cSld>
-  <p:clrMapOvr>
-    <a:masterClrMapping/>
-  </p:clrMapOvr>
-</p:sld>
-</file>
-
 <file path=ppt/slides/slide29.xml><?xml version="1.0" encoding="utf-8"?>
 <p:sld xmlns:a="http://schemas.openxmlformats.org/drawingml/2006/main" xmlns:r="http://schemas.openxmlformats.org/officeDocument/2006/relationships" xmlns:p="http://schemas.openxmlformats.org/presentationml/2006/main">
   <p:cSld>
@@ -10631,51 +11188,6 @@
           <a:chExt cx="0" cy="0"/>
         </a:xfrm>
       </p:grpSpPr>
-      <p:sp>
-        <p:nvSpPr>
-          <p:cNvPr id="2" name="文本占位符 1"/>
-          <p:cNvSpPr>
-            <a:spLocks noGrp="1"/>
-          </p:cNvSpPr>
-          <p:nvPr>
-            <p:ph type="body" idx="1"/>
-          </p:nvPr>
-        </p:nvSpPr>
-        <p:spPr/>
-        <p:txBody>
-          <a:bodyPr/>
-          <a:lstStyle/>
-          <a:p>
-            <a:pPr marL="285750" indent="-285750">
-              <a:buFont typeface="Arial" panose="020B0604020202020204" pitchFamily="34" charset="0"/>
-              <a:buChar char="•"/>
-            </a:pPr>
-            <a:endParaRPr lang="en-US" altLang="zh-CN" dirty="0"/>
-          </a:p>
-        </p:txBody>
-      </p:sp>
-      <p:sp>
-        <p:nvSpPr>
-          <p:cNvPr id="3" name="标题 2"/>
-          <p:cNvSpPr>
-            <a:spLocks noGrp="1"/>
-          </p:cNvSpPr>
-          <p:nvPr>
-            <p:ph type="title"/>
-          </p:nvPr>
-        </p:nvSpPr>
-        <p:spPr/>
-        <p:txBody>
-          <a:bodyPr/>
-          <a:lstStyle/>
-          <a:p>
-            <a:r>
-              <a:rPr lang="zh-CN" altLang="en-US"/>
-              <a:t>问答</a:t>
-            </a:r>
-          </a:p>
-        </p:txBody>
-      </p:sp>
     </p:spTree>
     <p:custDataLst>
       <p:tags r:id="rId1"/>
@@ -10906,6 +11418,79 @@
 </file>
 
 <file path=ppt/slides/slide30.xml><?xml version="1.0" encoding="utf-8"?>
+<p:sld xmlns:a="http://schemas.openxmlformats.org/drawingml/2006/main" xmlns:r="http://schemas.openxmlformats.org/officeDocument/2006/relationships" xmlns:p="http://schemas.openxmlformats.org/presentationml/2006/main">
+  <p:cSld>
+    <p:spTree>
+      <p:nvGrpSpPr>
+        <p:cNvPr id="1" name=""/>
+        <p:cNvGrpSpPr/>
+        <p:nvPr/>
+      </p:nvGrpSpPr>
+      <p:grpSpPr>
+        <a:xfrm>
+          <a:off x="0" y="0"/>
+          <a:ext cx="0" cy="0"/>
+          <a:chOff x="0" y="0"/>
+          <a:chExt cx="0" cy="0"/>
+        </a:xfrm>
+      </p:grpSpPr>
+      <p:sp>
+        <p:nvSpPr>
+          <p:cNvPr id="2" name="文本占位符 1"/>
+          <p:cNvSpPr>
+            <a:spLocks noGrp="1"/>
+          </p:cNvSpPr>
+          <p:nvPr>
+            <p:ph type="body" idx="1"/>
+          </p:nvPr>
+        </p:nvSpPr>
+        <p:spPr/>
+        <p:txBody>
+          <a:bodyPr/>
+          <a:lstStyle/>
+          <a:p>
+            <a:pPr marL="285750" indent="-285750">
+              <a:buFont typeface="Arial" panose="020B0604020202020204" pitchFamily="34" charset="0"/>
+              <a:buChar char="•"/>
+            </a:pPr>
+            <a:endParaRPr lang="en-US" altLang="zh-CN" dirty="0"/>
+          </a:p>
+        </p:txBody>
+      </p:sp>
+      <p:sp>
+        <p:nvSpPr>
+          <p:cNvPr id="3" name="标题 2"/>
+          <p:cNvSpPr>
+            <a:spLocks noGrp="1"/>
+          </p:cNvSpPr>
+          <p:nvPr>
+            <p:ph type="title"/>
+          </p:nvPr>
+        </p:nvSpPr>
+        <p:spPr/>
+        <p:txBody>
+          <a:bodyPr/>
+          <a:lstStyle/>
+          <a:p>
+            <a:r>
+              <a:rPr lang="zh-CN" altLang="en-US"/>
+              <a:t>问答</a:t>
+            </a:r>
+          </a:p>
+        </p:txBody>
+      </p:sp>
+    </p:spTree>
+    <p:custDataLst>
+      <p:tags r:id="rId1"/>
+    </p:custDataLst>
+  </p:cSld>
+  <p:clrMapOvr>
+    <a:masterClrMapping/>
+  </p:clrMapOvr>
+</p:sld>
+</file>
+
+<file path=ppt/slides/slide31.xml><?xml version="1.0" encoding="utf-8"?>
 <p:sld xmlns:a="http://schemas.openxmlformats.org/drawingml/2006/main" xmlns:r="http://schemas.openxmlformats.org/officeDocument/2006/relationships" xmlns:p="http://schemas.openxmlformats.org/presentationml/2006/main">
   <p:cSld>
     <p:spTree>
@@ -13303,6 +13888,15 @@
 </p:tagLst>
 </file>
 
+<file path=ppt/tags/tag100.xml><?xml version="1.0" encoding="utf-8"?>
+<p:tagLst xmlns:a="http://schemas.openxmlformats.org/drawingml/2006/main" xmlns:r="http://schemas.openxmlformats.org/officeDocument/2006/relationships" xmlns:p="http://schemas.openxmlformats.org/presentationml/2006/main">
+  <p:tag name="KSO_WM_BEAUTIFY_FLAG" val="#wm#"/>
+  <p:tag name="KSO_WM_TEMPLATE_CATEGORY" val="custom"/>
+  <p:tag name="KSO_WM_TEMPLATE_INDEX" val="20187308"/>
+  <p:tag name="KSO_WM_SPECIAL_SOURCE" val="bdnull"/>
+</p:tagLst>
+</file>
+
 <file path=ppt/tags/tag11.xml><?xml version="1.0" encoding="utf-8"?>
 <p:tagLst xmlns:a="http://schemas.openxmlformats.org/drawingml/2006/main" xmlns:r="http://schemas.openxmlformats.org/officeDocument/2006/relationships" xmlns:p="http://schemas.openxmlformats.org/presentationml/2006/main">
   <p:tag name="KSO_WM_UNIT_HIGHLIGHT" val="0"/>

</xml_diff>